<commit_message>
change buffer function to arrayBuffer function so that it can be used by node AND the browser
</commit_message>
<xml_diff>
--- a/examples/solar_system_example/pptx/output.pptx
+++ b/examples/solar_system_example/pptx/output.pptx
@@ -358,7 +358,7 @@
             <c:idx val="1"/>
             <c:spPr>
               <a:solidFill>
-                <a:srgbClr val="3b19ba"/>
+                <a:srgbClr val="b84780"/>
               </a:solidFill>
             </c:spPr>
           </c:dPt>
@@ -366,7 +366,7 @@
             <c:idx val="2"/>
             <c:spPr>
               <a:solidFill>
-                <a:srgbClr val="8ceb30"/>
+                <a:srgbClr val="5050e5"/>
               </a:solidFill>
             </c:spPr>
           </c:dPt>
@@ -374,7 +374,7 @@
             <c:idx val="3"/>
             <c:spPr>
               <a:solidFill>
-                <a:srgbClr val="41a353"/>
+                <a:srgbClr val="e403b3"/>
               </a:solidFill>
             </c:spPr>
           </c:dPt>
@@ -382,7 +382,7 @@
             <c:idx val="4"/>
             <c:spPr>
               <a:solidFill>
-                <a:srgbClr val="bb401b"/>
+                <a:srgbClr val="453af1"/>
               </a:solidFill>
             </c:spPr>
           </c:dPt>
@@ -390,7 +390,7 @@
             <c:idx val="5"/>
             <c:spPr>
               <a:solidFill>
-                <a:srgbClr val="d58939"/>
+                <a:srgbClr val="45d765"/>
               </a:solidFill>
             </c:spPr>
           </c:dPt>
@@ -398,7 +398,7 @@
             <c:idx val="6"/>
             <c:spPr>
               <a:solidFill>
-                <a:srgbClr val="ef046e"/>
+                <a:srgbClr val="81a758"/>
               </a:solidFill>
             </c:spPr>
           </c:dPt>
@@ -406,7 +406,7 @@
             <c:idx val="7"/>
             <c:spPr>
               <a:solidFill>
-                <a:srgbClr val="89d73e"/>
+                <a:srgbClr val="3ba40b"/>
               </a:solidFill>
             </c:spPr>
           </c:dPt>
@@ -414,7 +414,7 @@
             <c:idx val="8"/>
             <c:spPr>
               <a:solidFill>
-                <a:srgbClr val="8e0a6f"/>
+                <a:srgbClr val="2d1fda"/>
               </a:solidFill>
             </c:spPr>
           </c:dPt>
@@ -422,7 +422,7 @@
             <c:idx val="9"/>
             <c:spPr>
               <a:solidFill>
-                <a:srgbClr val="f75908"/>
+                <a:srgbClr val="862e11"/>
               </a:solidFill>
             </c:spPr>
           </c:dPt>
@@ -430,7 +430,7 @@
             <c:idx val="10"/>
             <c:spPr>
               <a:solidFill>
-                <a:srgbClr val="9f8218"/>
+                <a:srgbClr val="26fc45"/>
               </a:solidFill>
             </c:spPr>
           </c:dPt>
@@ -438,7 +438,7 @@
             <c:idx val="11"/>
             <c:spPr>
               <a:solidFill>
-                <a:srgbClr val="680d81"/>
+                <a:srgbClr val="1d21e8"/>
               </a:solidFill>
             </c:spPr>
           </c:dPt>
@@ -446,7 +446,7 @@
             <c:idx val="12"/>
             <c:spPr>
               <a:solidFill>
-                <a:srgbClr val="c2fd25"/>
+                <a:srgbClr val="62ed58"/>
               </a:solidFill>
             </c:spPr>
           </c:dPt>
@@ -664,7 +664,7 @@
             <c:idx val="1"/>
             <c:spPr>
               <a:solidFill>
-                <a:srgbClr val="3b19ba"/>
+                <a:srgbClr val="b84780"/>
               </a:solidFill>
             </c:spPr>
           </c:dPt>
@@ -672,7 +672,7 @@
             <c:idx val="2"/>
             <c:spPr>
               <a:solidFill>
-                <a:srgbClr val="8ceb30"/>
+                <a:srgbClr val="5050e5"/>
               </a:solidFill>
             </c:spPr>
           </c:dPt>
@@ -680,7 +680,7 @@
             <c:idx val="3"/>
             <c:spPr>
               <a:solidFill>
-                <a:srgbClr val="41a353"/>
+                <a:srgbClr val="e403b3"/>
               </a:solidFill>
             </c:spPr>
           </c:dPt>
@@ -688,7 +688,7 @@
             <c:idx val="4"/>
             <c:spPr>
               <a:solidFill>
-                <a:srgbClr val="bb401b"/>
+                <a:srgbClr val="453af1"/>
               </a:solidFill>
             </c:spPr>
           </c:dPt>
@@ -696,7 +696,7 @@
             <c:idx val="5"/>
             <c:spPr>
               <a:solidFill>
-                <a:srgbClr val="d58939"/>
+                <a:srgbClr val="45d765"/>
               </a:solidFill>
             </c:spPr>
           </c:dPt>
@@ -704,7 +704,7 @@
             <c:idx val="6"/>
             <c:spPr>
               <a:solidFill>
-                <a:srgbClr val="ef046e"/>
+                <a:srgbClr val="81a758"/>
               </a:solidFill>
             </c:spPr>
           </c:dPt>
@@ -712,7 +712,7 @@
             <c:idx val="7"/>
             <c:spPr>
               <a:solidFill>
-                <a:srgbClr val="89d73e"/>
+                <a:srgbClr val="3ba40b"/>
               </a:solidFill>
             </c:spPr>
           </c:dPt>
@@ -720,7 +720,7 @@
             <c:idx val="8"/>
             <c:spPr>
               <a:solidFill>
-                <a:srgbClr val="8e0a6f"/>
+                <a:srgbClr val="2d1fda"/>
               </a:solidFill>
             </c:spPr>
           </c:dPt>
@@ -728,7 +728,7 @@
             <c:idx val="9"/>
             <c:spPr>
               <a:solidFill>
-                <a:srgbClr val="f75908"/>
+                <a:srgbClr val="862e11"/>
               </a:solidFill>
             </c:spPr>
           </c:dPt>
@@ -736,7 +736,7 @@
             <c:idx val="10"/>
             <c:spPr>
               <a:solidFill>
-                <a:srgbClr val="9f8218"/>
+                <a:srgbClr val="26fc45"/>
               </a:solidFill>
             </c:spPr>
           </c:dPt>
@@ -744,7 +744,7 @@
             <c:idx val="11"/>
             <c:spPr>
               <a:solidFill>
-                <a:srgbClr val="680d81"/>
+                <a:srgbClr val="1d21e8"/>
               </a:solidFill>
             </c:spPr>
           </c:dPt>
@@ -752,7 +752,7 @@
             <c:idx val="12"/>
             <c:spPr>
               <a:solidFill>
-                <a:srgbClr val="c2fd25"/>
+                <a:srgbClr val="62ed58"/>
               </a:solidFill>
             </c:spPr>
           </c:dPt>
@@ -11773,7 +11773,7 @@
       </p:sp>
       <p:graphicFrame>
         <p:nvGraphicFramePr>
-          <p:cNvPr id="3606" name="Chart 3"/>
+          <p:cNvPr id="377" name="Chart 3"/>
           <p:cNvGraphicFramePr/>
           <p:nvPr>
                     </p:nvPr>

</xml_diff>

<commit_message>
solar system example: change meanRadius to equaRadius
</commit_message>
<xml_diff>
--- a/examples/solar_system_example/pptx/output.pptx
+++ b/examples/solar_system_example/pptx/output.pptx
@@ -358,7 +358,7 @@
             <c:idx val="1"/>
             <c:spPr>
               <a:solidFill>
-                <a:srgbClr val="b84780"/>
+                <a:srgbClr val="9d39b5"/>
               </a:solidFill>
             </c:spPr>
           </c:dPt>
@@ -366,7 +366,7 @@
             <c:idx val="2"/>
             <c:spPr>
               <a:solidFill>
-                <a:srgbClr val="5050e5"/>
+                <a:srgbClr val="a7b605"/>
               </a:solidFill>
             </c:spPr>
           </c:dPt>
@@ -374,7 +374,7 @@
             <c:idx val="3"/>
             <c:spPr>
               <a:solidFill>
-                <a:srgbClr val="e403b3"/>
+                <a:srgbClr val="ada762"/>
               </a:solidFill>
             </c:spPr>
           </c:dPt>
@@ -382,7 +382,7 @@
             <c:idx val="4"/>
             <c:spPr>
               <a:solidFill>
-                <a:srgbClr val="453af1"/>
+                <a:srgbClr val="3def3a"/>
               </a:solidFill>
             </c:spPr>
           </c:dPt>
@@ -390,7 +390,7 @@
             <c:idx val="5"/>
             <c:spPr>
               <a:solidFill>
-                <a:srgbClr val="45d765"/>
+                <a:srgbClr val="10f9f4"/>
               </a:solidFill>
             </c:spPr>
           </c:dPt>
@@ -398,7 +398,7 @@
             <c:idx val="6"/>
             <c:spPr>
               <a:solidFill>
-                <a:srgbClr val="81a758"/>
+                <a:srgbClr val="56a888"/>
               </a:solidFill>
             </c:spPr>
           </c:dPt>
@@ -406,7 +406,7 @@
             <c:idx val="7"/>
             <c:spPr>
               <a:solidFill>
-                <a:srgbClr val="3ba40b"/>
+                <a:srgbClr val="d9edcc"/>
               </a:solidFill>
             </c:spPr>
           </c:dPt>
@@ -414,7 +414,7 @@
             <c:idx val="8"/>
             <c:spPr>
               <a:solidFill>
-                <a:srgbClr val="2d1fda"/>
+                <a:srgbClr val="5f9369"/>
               </a:solidFill>
             </c:spPr>
           </c:dPt>
@@ -422,7 +422,7 @@
             <c:idx val="9"/>
             <c:spPr>
               <a:solidFill>
-                <a:srgbClr val="862e11"/>
+                <a:srgbClr val="5e5e61"/>
               </a:solidFill>
             </c:spPr>
           </c:dPt>
@@ -430,7 +430,7 @@
             <c:idx val="10"/>
             <c:spPr>
               <a:solidFill>
-                <a:srgbClr val="26fc45"/>
+                <a:srgbClr val="1ccd9c"/>
               </a:solidFill>
             </c:spPr>
           </c:dPt>
@@ -438,7 +438,7 @@
             <c:idx val="11"/>
             <c:spPr>
               <a:solidFill>
-                <a:srgbClr val="1d21e8"/>
+                <a:srgbClr val="f6b5fa"/>
               </a:solidFill>
             </c:spPr>
           </c:dPt>
@@ -446,7 +446,7 @@
             <c:idx val="12"/>
             <c:spPr>
               <a:solidFill>
-                <a:srgbClr val="62ed58"/>
+                <a:srgbClr val="efda2f"/>
               </a:solidFill>
             </c:spPr>
           </c:dPt>
@@ -504,40 +504,40 @@
                 <c:formatCode>General</c:formatCode>
                 <c:ptCount val="13"/>
                 <c:pt idx="0">
-                  <c:v>476.2</c:v>
+                  <c:v>487</c:v>
                 </c:pt>
                 <c:pt idx="1">
-                  <c:v>1163</c:v>
+                  <c:v>0</c:v>
                 </c:pt>
                 <c:pt idx="2">
-                  <c:v>25362</c:v>
+                  <c:v>25559</c:v>
                 </c:pt>
                 <c:pt idx="3">
                   <c:v>1188.3</c:v>
                 </c:pt>
                 <c:pt idx="4">
-                  <c:v>24622</c:v>
+                  <c:v>24764</c:v>
                 </c:pt>
                 <c:pt idx="5">
-                  <c:v>33</c:v>
+                  <c:v>0</c:v>
                 </c:pt>
                 <c:pt idx="6">
-                  <c:v>725</c:v>
+                  <c:v>745</c:v>
                 </c:pt>
                 <c:pt idx="7">
-                  <c:v>69911</c:v>
+                  <c:v>71492</c:v>
                 </c:pt>
                 <c:pt idx="8">
-                  <c:v>3389.5</c:v>
+                  <c:v>3396.19</c:v>
                 </c:pt>
                 <c:pt idx="9">
-                  <c:v>2439.4</c:v>
+                  <c:v>2440.53</c:v>
                 </c:pt>
                 <c:pt idx="10">
-                  <c:v>58232</c:v>
+                  <c:v>60268</c:v>
                 </c:pt>
                 <c:pt idx="11">
-                  <c:v>6371.0084</c:v>
+                  <c:v>6378.1366</c:v>
                 </c:pt>
                 <c:pt idx="12">
                   <c:v>6051.8</c:v>
@@ -664,7 +664,7 @@
             <c:idx val="1"/>
             <c:spPr>
               <a:solidFill>
-                <a:srgbClr val="b84780"/>
+                <a:srgbClr val="9d39b5"/>
               </a:solidFill>
             </c:spPr>
           </c:dPt>
@@ -672,7 +672,7 @@
             <c:idx val="2"/>
             <c:spPr>
               <a:solidFill>
-                <a:srgbClr val="5050e5"/>
+                <a:srgbClr val="a7b605"/>
               </a:solidFill>
             </c:spPr>
           </c:dPt>
@@ -680,7 +680,7 @@
             <c:idx val="3"/>
             <c:spPr>
               <a:solidFill>
-                <a:srgbClr val="e403b3"/>
+                <a:srgbClr val="ada762"/>
               </a:solidFill>
             </c:spPr>
           </c:dPt>
@@ -688,7 +688,7 @@
             <c:idx val="4"/>
             <c:spPr>
               <a:solidFill>
-                <a:srgbClr val="453af1"/>
+                <a:srgbClr val="3def3a"/>
               </a:solidFill>
             </c:spPr>
           </c:dPt>
@@ -696,7 +696,7 @@
             <c:idx val="5"/>
             <c:spPr>
               <a:solidFill>
-                <a:srgbClr val="45d765"/>
+                <a:srgbClr val="10f9f4"/>
               </a:solidFill>
             </c:spPr>
           </c:dPt>
@@ -704,7 +704,7 @@
             <c:idx val="6"/>
             <c:spPr>
               <a:solidFill>
-                <a:srgbClr val="81a758"/>
+                <a:srgbClr val="56a888"/>
               </a:solidFill>
             </c:spPr>
           </c:dPt>
@@ -712,7 +712,7 @@
             <c:idx val="7"/>
             <c:spPr>
               <a:solidFill>
-                <a:srgbClr val="3ba40b"/>
+                <a:srgbClr val="d9edcc"/>
               </a:solidFill>
             </c:spPr>
           </c:dPt>
@@ -720,7 +720,7 @@
             <c:idx val="8"/>
             <c:spPr>
               <a:solidFill>
-                <a:srgbClr val="2d1fda"/>
+                <a:srgbClr val="5f9369"/>
               </a:solidFill>
             </c:spPr>
           </c:dPt>
@@ -728,7 +728,7 @@
             <c:idx val="9"/>
             <c:spPr>
               <a:solidFill>
-                <a:srgbClr val="862e11"/>
+                <a:srgbClr val="5e5e61"/>
               </a:solidFill>
             </c:spPr>
           </c:dPt>
@@ -736,7 +736,7 @@
             <c:idx val="10"/>
             <c:spPr>
               <a:solidFill>
-                <a:srgbClr val="26fc45"/>
+                <a:srgbClr val="1ccd9c"/>
               </a:solidFill>
             </c:spPr>
           </c:dPt>
@@ -744,7 +744,7 @@
             <c:idx val="11"/>
             <c:spPr>
               <a:solidFill>
-                <a:srgbClr val="1d21e8"/>
+                <a:srgbClr val="f6b5fa"/>
               </a:solidFill>
             </c:spPr>
           </c:dPt>
@@ -752,7 +752,7 @@
             <c:idx val="12"/>
             <c:spPr>
               <a:solidFill>
-                <a:srgbClr val="62ed58"/>
+                <a:srgbClr val="efda2f"/>
               </a:solidFill>
             </c:spPr>
           </c:dPt>
@@ -810,40 +810,40 @@
                 <c:formatCode>General</c:formatCode>
                 <c:ptCount val="13"/>
                 <c:pt idx="0">
-                  <c:v>476.2</c:v>
+                  <c:v>487</c:v>
                 </c:pt>
                 <c:pt idx="1">
-                  <c:v>1163</c:v>
+                  <c:v>0</c:v>
                 </c:pt>
                 <c:pt idx="2">
-                  <c:v>25362</c:v>
+                  <c:v>25559</c:v>
                 </c:pt>
                 <c:pt idx="3">
                   <c:v>1188.3</c:v>
                 </c:pt>
                 <c:pt idx="4">
-                  <c:v>24622</c:v>
+                  <c:v>24764</c:v>
                 </c:pt>
                 <c:pt idx="5">
-                  <c:v>33</c:v>
+                  <c:v>0</c:v>
                 </c:pt>
                 <c:pt idx="6">
-                  <c:v>725</c:v>
+                  <c:v>745</c:v>
                 </c:pt>
                 <c:pt idx="7">
-                  <c:v>69911</c:v>
+                  <c:v>71492</c:v>
                 </c:pt>
                 <c:pt idx="8">
-                  <c:v>3389.5</c:v>
+                  <c:v>3396.19</c:v>
                 </c:pt>
                 <c:pt idx="9">
-                  <c:v>2439.4</c:v>
+                  <c:v>2440.53</c:v>
                 </c:pt>
                 <c:pt idx="10">
-                  <c:v>58232</c:v>
+                  <c:v>60268</c:v>
                 </c:pt>
                 <c:pt idx="11">
-                  <c:v>6371.0084</c:v>
+                  <c:v>6378.1366</c:v>
                 </c:pt>
                 <c:pt idx="12">
                   <c:v>6051.8</c:v>
@@ -11773,7 +11773,7 @@
       </p:sp>
       <p:graphicFrame>
         <p:nvGraphicFramePr>
-          <p:cNvPr id="377" name="Chart 3"/>
+          <p:cNvPr id="3729" name="Chart 3"/>
           <p:cNvGraphicFramePr/>
           <p:nvPr>
                     </p:nvPr>

</xml_diff>

<commit_message>
rename apex office print to cloud office print
</commit_message>
<xml_diff>
--- a/examples/solar_system_example/pptx/output.pptx
+++ b/examples/solar_system_example/pptx/output.pptx
@@ -358,7 +358,7 @@
             <c:idx val="1"/>
             <c:spPr>
               <a:solidFill>
-                <a:srgbClr val="9d39b5"/>
+                <a:srgbClr val="885744"/>
               </a:solidFill>
             </c:spPr>
           </c:dPt>
@@ -366,7 +366,7 @@
             <c:idx val="2"/>
             <c:spPr>
               <a:solidFill>
-                <a:srgbClr val="a7b605"/>
+                <a:srgbClr val="52c29e"/>
               </a:solidFill>
             </c:spPr>
           </c:dPt>
@@ -374,7 +374,7 @@
             <c:idx val="3"/>
             <c:spPr>
               <a:solidFill>
-                <a:srgbClr val="ada762"/>
+                <a:srgbClr val="4f0e30"/>
               </a:solidFill>
             </c:spPr>
           </c:dPt>
@@ -382,7 +382,7 @@
             <c:idx val="4"/>
             <c:spPr>
               <a:solidFill>
-                <a:srgbClr val="3def3a"/>
+                <a:srgbClr val="3d8163"/>
               </a:solidFill>
             </c:spPr>
           </c:dPt>
@@ -390,7 +390,7 @@
             <c:idx val="5"/>
             <c:spPr>
               <a:solidFill>
-                <a:srgbClr val="10f9f4"/>
+                <a:srgbClr val="fb52c7"/>
               </a:solidFill>
             </c:spPr>
           </c:dPt>
@@ -398,7 +398,7 @@
             <c:idx val="6"/>
             <c:spPr>
               <a:solidFill>
-                <a:srgbClr val="56a888"/>
+                <a:srgbClr val="6ba788"/>
               </a:solidFill>
             </c:spPr>
           </c:dPt>
@@ -406,7 +406,7 @@
             <c:idx val="7"/>
             <c:spPr>
               <a:solidFill>
-                <a:srgbClr val="d9edcc"/>
+                <a:srgbClr val="04aa15"/>
               </a:solidFill>
             </c:spPr>
           </c:dPt>
@@ -414,7 +414,7 @@
             <c:idx val="8"/>
             <c:spPr>
               <a:solidFill>
-                <a:srgbClr val="5f9369"/>
+                <a:srgbClr val="5192e8"/>
               </a:solidFill>
             </c:spPr>
           </c:dPt>
@@ -422,7 +422,7 @@
             <c:idx val="9"/>
             <c:spPr>
               <a:solidFill>
-                <a:srgbClr val="5e5e61"/>
+                <a:srgbClr val="14b5cf"/>
               </a:solidFill>
             </c:spPr>
           </c:dPt>
@@ -430,7 +430,7 @@
             <c:idx val="10"/>
             <c:spPr>
               <a:solidFill>
-                <a:srgbClr val="1ccd9c"/>
+                <a:srgbClr val="99585a"/>
               </a:solidFill>
             </c:spPr>
           </c:dPt>
@@ -438,7 +438,7 @@
             <c:idx val="11"/>
             <c:spPr>
               <a:solidFill>
-                <a:srgbClr val="f6b5fa"/>
+                <a:srgbClr val="cd5cb6"/>
               </a:solidFill>
             </c:spPr>
           </c:dPt>
@@ -446,7 +446,7 @@
             <c:idx val="12"/>
             <c:spPr>
               <a:solidFill>
-                <a:srgbClr val="efda2f"/>
+                <a:srgbClr val="4df40b"/>
               </a:solidFill>
             </c:spPr>
           </c:dPt>
@@ -664,7 +664,7 @@
             <c:idx val="1"/>
             <c:spPr>
               <a:solidFill>
-                <a:srgbClr val="9d39b5"/>
+                <a:srgbClr val="885744"/>
               </a:solidFill>
             </c:spPr>
           </c:dPt>
@@ -672,7 +672,7 @@
             <c:idx val="2"/>
             <c:spPr>
               <a:solidFill>
-                <a:srgbClr val="a7b605"/>
+                <a:srgbClr val="52c29e"/>
               </a:solidFill>
             </c:spPr>
           </c:dPt>
@@ -680,7 +680,7 @@
             <c:idx val="3"/>
             <c:spPr>
               <a:solidFill>
-                <a:srgbClr val="ada762"/>
+                <a:srgbClr val="4f0e30"/>
               </a:solidFill>
             </c:spPr>
           </c:dPt>
@@ -688,7 +688,7 @@
             <c:idx val="4"/>
             <c:spPr>
               <a:solidFill>
-                <a:srgbClr val="3def3a"/>
+                <a:srgbClr val="3d8163"/>
               </a:solidFill>
             </c:spPr>
           </c:dPt>
@@ -696,7 +696,7 @@
             <c:idx val="5"/>
             <c:spPr>
               <a:solidFill>
-                <a:srgbClr val="10f9f4"/>
+                <a:srgbClr val="fb52c7"/>
               </a:solidFill>
             </c:spPr>
           </c:dPt>
@@ -704,7 +704,7 @@
             <c:idx val="6"/>
             <c:spPr>
               <a:solidFill>
-                <a:srgbClr val="56a888"/>
+                <a:srgbClr val="6ba788"/>
               </a:solidFill>
             </c:spPr>
           </c:dPt>
@@ -712,7 +712,7 @@
             <c:idx val="7"/>
             <c:spPr>
               <a:solidFill>
-                <a:srgbClr val="d9edcc"/>
+                <a:srgbClr val="04aa15"/>
               </a:solidFill>
             </c:spPr>
           </c:dPt>
@@ -720,7 +720,7 @@
             <c:idx val="8"/>
             <c:spPr>
               <a:solidFill>
-                <a:srgbClr val="5f9369"/>
+                <a:srgbClr val="5192e8"/>
               </a:solidFill>
             </c:spPr>
           </c:dPt>
@@ -728,7 +728,7 @@
             <c:idx val="9"/>
             <c:spPr>
               <a:solidFill>
-                <a:srgbClr val="5e5e61"/>
+                <a:srgbClr val="14b5cf"/>
               </a:solidFill>
             </c:spPr>
           </c:dPt>
@@ -736,7 +736,7 @@
             <c:idx val="10"/>
             <c:spPr>
               <a:solidFill>
-                <a:srgbClr val="1ccd9c"/>
+                <a:srgbClr val="99585a"/>
               </a:solidFill>
             </c:spPr>
           </c:dPt>
@@ -744,7 +744,7 @@
             <c:idx val="11"/>
             <c:spPr>
               <a:solidFill>
-                <a:srgbClr val="f6b5fa"/>
+                <a:srgbClr val="cd5cb6"/>
               </a:solidFill>
             </c:spPr>
           </c:dPt>
@@ -752,7 +752,7 @@
             <c:idx val="12"/>
             <c:spPr>
               <a:solidFill>
-                <a:srgbClr val="efda2f"/>
+                <a:srgbClr val="4df40b"/>
               </a:solidFill>
             </c:spPr>
           </c:dPt>
@@ -11773,7 +11773,7 @@
       </p:sp>
       <p:graphicFrame>
         <p:nvGraphicFramePr>
-          <p:cNvPr id="3729" name="Chart 3"/>
+          <p:cNvPr id="3407" name="Chart 3"/>
           <p:cNvGraphicFramePr/>
           <p:nvPr>
                     </p:nvPr>

</xml_diff>

<commit_message>
create markdown for solar system example
</commit_message>
<xml_diff>
--- a/examples/solar_system_example/pptx/output.pptx
+++ b/examples/solar_system_example/pptx/output.pptx
@@ -358,7 +358,7 @@
             <c:idx val="1"/>
             <c:spPr>
               <a:solidFill>
-                <a:srgbClr val="885744"/>
+                <a:srgbClr val="b40404"/>
               </a:solidFill>
             </c:spPr>
           </c:dPt>
@@ -366,7 +366,7 @@
             <c:idx val="2"/>
             <c:spPr>
               <a:solidFill>
-                <a:srgbClr val="52c29e"/>
+                <a:srgbClr val="2828c2"/>
               </a:solidFill>
             </c:spPr>
           </c:dPt>
@@ -374,7 +374,7 @@
             <c:idx val="3"/>
             <c:spPr>
               <a:solidFill>
-                <a:srgbClr val="4f0e30"/>
+                <a:srgbClr val="2a2cdb"/>
               </a:solidFill>
             </c:spPr>
           </c:dPt>
@@ -382,7 +382,7 @@
             <c:idx val="4"/>
             <c:spPr>
               <a:solidFill>
-                <a:srgbClr val="3d8163"/>
+                <a:srgbClr val="827580"/>
               </a:solidFill>
             </c:spPr>
           </c:dPt>
@@ -390,7 +390,7 @@
             <c:idx val="5"/>
             <c:spPr>
               <a:solidFill>
-                <a:srgbClr val="fb52c7"/>
+                <a:srgbClr val="8bf05d"/>
               </a:solidFill>
             </c:spPr>
           </c:dPt>
@@ -398,7 +398,7 @@
             <c:idx val="6"/>
             <c:spPr>
               <a:solidFill>
-                <a:srgbClr val="6ba788"/>
+                <a:srgbClr val="90f3fe"/>
               </a:solidFill>
             </c:spPr>
           </c:dPt>
@@ -406,7 +406,7 @@
             <c:idx val="7"/>
             <c:spPr>
               <a:solidFill>
-                <a:srgbClr val="04aa15"/>
+                <a:srgbClr val="c0b282"/>
               </a:solidFill>
             </c:spPr>
           </c:dPt>
@@ -414,7 +414,7 @@
             <c:idx val="8"/>
             <c:spPr>
               <a:solidFill>
-                <a:srgbClr val="5192e8"/>
+                <a:srgbClr val="96bb18"/>
               </a:solidFill>
             </c:spPr>
           </c:dPt>
@@ -422,7 +422,7 @@
             <c:idx val="9"/>
             <c:spPr>
               <a:solidFill>
-                <a:srgbClr val="14b5cf"/>
+                <a:srgbClr val="0bee13"/>
               </a:solidFill>
             </c:spPr>
           </c:dPt>
@@ -430,7 +430,7 @@
             <c:idx val="10"/>
             <c:spPr>
               <a:solidFill>
-                <a:srgbClr val="99585a"/>
+                <a:srgbClr val="c28510"/>
               </a:solidFill>
             </c:spPr>
           </c:dPt>
@@ -438,7 +438,7 @@
             <c:idx val="11"/>
             <c:spPr>
               <a:solidFill>
-                <a:srgbClr val="cd5cb6"/>
+                <a:srgbClr val="a6e05d"/>
               </a:solidFill>
             </c:spPr>
           </c:dPt>
@@ -446,7 +446,7 @@
             <c:idx val="12"/>
             <c:spPr>
               <a:solidFill>
-                <a:srgbClr val="4df40b"/>
+                <a:srgbClr val="385b7c"/>
               </a:solidFill>
             </c:spPr>
           </c:dPt>
@@ -664,7 +664,7 @@
             <c:idx val="1"/>
             <c:spPr>
               <a:solidFill>
-                <a:srgbClr val="885744"/>
+                <a:srgbClr val="b40404"/>
               </a:solidFill>
             </c:spPr>
           </c:dPt>
@@ -672,7 +672,7 @@
             <c:idx val="2"/>
             <c:spPr>
               <a:solidFill>
-                <a:srgbClr val="52c29e"/>
+                <a:srgbClr val="2828c2"/>
               </a:solidFill>
             </c:spPr>
           </c:dPt>
@@ -680,7 +680,7 @@
             <c:idx val="3"/>
             <c:spPr>
               <a:solidFill>
-                <a:srgbClr val="4f0e30"/>
+                <a:srgbClr val="2a2cdb"/>
               </a:solidFill>
             </c:spPr>
           </c:dPt>
@@ -688,7 +688,7 @@
             <c:idx val="4"/>
             <c:spPr>
               <a:solidFill>
-                <a:srgbClr val="3d8163"/>
+                <a:srgbClr val="827580"/>
               </a:solidFill>
             </c:spPr>
           </c:dPt>
@@ -696,7 +696,7 @@
             <c:idx val="5"/>
             <c:spPr>
               <a:solidFill>
-                <a:srgbClr val="fb52c7"/>
+                <a:srgbClr val="8bf05d"/>
               </a:solidFill>
             </c:spPr>
           </c:dPt>
@@ -704,7 +704,7 @@
             <c:idx val="6"/>
             <c:spPr>
               <a:solidFill>
-                <a:srgbClr val="6ba788"/>
+                <a:srgbClr val="90f3fe"/>
               </a:solidFill>
             </c:spPr>
           </c:dPt>
@@ -712,7 +712,7 @@
             <c:idx val="7"/>
             <c:spPr>
               <a:solidFill>
-                <a:srgbClr val="04aa15"/>
+                <a:srgbClr val="c0b282"/>
               </a:solidFill>
             </c:spPr>
           </c:dPt>
@@ -720,7 +720,7 @@
             <c:idx val="8"/>
             <c:spPr>
               <a:solidFill>
-                <a:srgbClr val="5192e8"/>
+                <a:srgbClr val="96bb18"/>
               </a:solidFill>
             </c:spPr>
           </c:dPt>
@@ -728,7 +728,7 @@
             <c:idx val="9"/>
             <c:spPr>
               <a:solidFill>
-                <a:srgbClr val="14b5cf"/>
+                <a:srgbClr val="0bee13"/>
               </a:solidFill>
             </c:spPr>
           </c:dPt>
@@ -736,7 +736,7 @@
             <c:idx val="10"/>
             <c:spPr>
               <a:solidFill>
-                <a:srgbClr val="99585a"/>
+                <a:srgbClr val="c28510"/>
               </a:solidFill>
             </c:spPr>
           </c:dPt>
@@ -744,7 +744,7 @@
             <c:idx val="11"/>
             <c:spPr>
               <a:solidFill>
-                <a:srgbClr val="cd5cb6"/>
+                <a:srgbClr val="a6e05d"/>
               </a:solidFill>
             </c:spPr>
           </c:dPt>
@@ -752,7 +752,7 @@
             <c:idx val="12"/>
             <c:spPr>
               <a:solidFill>
-                <a:srgbClr val="4df40b"/>
+                <a:srgbClr val="385b7c"/>
               </a:solidFill>
             </c:spPr>
           </c:dPt>
@@ -11773,7 +11773,7 @@
       </p:sp>
       <p:graphicFrame>
         <p:nvGraphicFramePr>
-          <p:cNvPr id="3407" name="Chart 3"/>
+          <p:cNvPr id="3386" name="Chart 3"/>
           <p:cNvGraphicFramePr/>
           <p:nvPr>
                     </p:nvPr>

</xml_diff>

<commit_message>
rewrite javascript examples; bugfix: await .toFile()
</commit_message>
<xml_diff>
--- a/examples/solar_system_example/pptx/output.pptx
+++ b/examples/solar_system_example/pptx/output.pptx
@@ -358,7 +358,7 @@
             <c:idx val="1"/>
             <c:spPr>
               <a:solidFill>
-                <a:srgbClr val="b40404"/>
+                <a:srgbClr val="057c70"/>
               </a:solidFill>
             </c:spPr>
           </c:dPt>
@@ -366,7 +366,7 @@
             <c:idx val="2"/>
             <c:spPr>
               <a:solidFill>
-                <a:srgbClr val="2828c2"/>
+                <a:srgbClr val="107414"/>
               </a:solidFill>
             </c:spPr>
           </c:dPt>
@@ -374,7 +374,7 @@
             <c:idx val="3"/>
             <c:spPr>
               <a:solidFill>
-                <a:srgbClr val="2a2cdb"/>
+                <a:srgbClr val="a35d30"/>
               </a:solidFill>
             </c:spPr>
           </c:dPt>
@@ -382,7 +382,7 @@
             <c:idx val="4"/>
             <c:spPr>
               <a:solidFill>
-                <a:srgbClr val="827580"/>
+                <a:srgbClr val="ddcbd1"/>
               </a:solidFill>
             </c:spPr>
           </c:dPt>
@@ -390,7 +390,7 @@
             <c:idx val="5"/>
             <c:spPr>
               <a:solidFill>
-                <a:srgbClr val="8bf05d"/>
+                <a:srgbClr val="e0a3a2"/>
               </a:solidFill>
             </c:spPr>
           </c:dPt>
@@ -398,7 +398,7 @@
             <c:idx val="6"/>
             <c:spPr>
               <a:solidFill>
-                <a:srgbClr val="90f3fe"/>
+                <a:srgbClr val="c6e210"/>
               </a:solidFill>
             </c:spPr>
           </c:dPt>
@@ -406,7 +406,7 @@
             <c:idx val="7"/>
             <c:spPr>
               <a:solidFill>
-                <a:srgbClr val="c0b282"/>
+                <a:srgbClr val="a3421e"/>
               </a:solidFill>
             </c:spPr>
           </c:dPt>
@@ -414,7 +414,7 @@
             <c:idx val="8"/>
             <c:spPr>
               <a:solidFill>
-                <a:srgbClr val="96bb18"/>
+                <a:srgbClr val="8134b6"/>
               </a:solidFill>
             </c:spPr>
           </c:dPt>
@@ -422,7 +422,7 @@
             <c:idx val="9"/>
             <c:spPr>
               <a:solidFill>
-                <a:srgbClr val="0bee13"/>
+                <a:srgbClr val="d28401"/>
               </a:solidFill>
             </c:spPr>
           </c:dPt>
@@ -430,7 +430,7 @@
             <c:idx val="10"/>
             <c:spPr>
               <a:solidFill>
-                <a:srgbClr val="c28510"/>
+                <a:srgbClr val="b04538"/>
               </a:solidFill>
             </c:spPr>
           </c:dPt>
@@ -438,7 +438,7 @@
             <c:idx val="11"/>
             <c:spPr>
               <a:solidFill>
-                <a:srgbClr val="a6e05d"/>
+                <a:srgbClr val="2103fe"/>
               </a:solidFill>
             </c:spPr>
           </c:dPt>
@@ -446,7 +446,7 @@
             <c:idx val="12"/>
             <c:spPr>
               <a:solidFill>
-                <a:srgbClr val="385b7c"/>
+                <a:srgbClr val="2ef661"/>
               </a:solidFill>
             </c:spPr>
           </c:dPt>
@@ -664,7 +664,7 @@
             <c:idx val="1"/>
             <c:spPr>
               <a:solidFill>
-                <a:srgbClr val="b40404"/>
+                <a:srgbClr val="057c70"/>
               </a:solidFill>
             </c:spPr>
           </c:dPt>
@@ -672,7 +672,7 @@
             <c:idx val="2"/>
             <c:spPr>
               <a:solidFill>
-                <a:srgbClr val="2828c2"/>
+                <a:srgbClr val="107414"/>
               </a:solidFill>
             </c:spPr>
           </c:dPt>
@@ -680,7 +680,7 @@
             <c:idx val="3"/>
             <c:spPr>
               <a:solidFill>
-                <a:srgbClr val="2a2cdb"/>
+                <a:srgbClr val="a35d30"/>
               </a:solidFill>
             </c:spPr>
           </c:dPt>
@@ -688,7 +688,7 @@
             <c:idx val="4"/>
             <c:spPr>
               <a:solidFill>
-                <a:srgbClr val="827580"/>
+                <a:srgbClr val="ddcbd1"/>
               </a:solidFill>
             </c:spPr>
           </c:dPt>
@@ -696,7 +696,7 @@
             <c:idx val="5"/>
             <c:spPr>
               <a:solidFill>
-                <a:srgbClr val="8bf05d"/>
+                <a:srgbClr val="e0a3a2"/>
               </a:solidFill>
             </c:spPr>
           </c:dPt>
@@ -704,7 +704,7 @@
             <c:idx val="6"/>
             <c:spPr>
               <a:solidFill>
-                <a:srgbClr val="90f3fe"/>
+                <a:srgbClr val="c6e210"/>
               </a:solidFill>
             </c:spPr>
           </c:dPt>
@@ -712,7 +712,7 @@
             <c:idx val="7"/>
             <c:spPr>
               <a:solidFill>
-                <a:srgbClr val="c0b282"/>
+                <a:srgbClr val="a3421e"/>
               </a:solidFill>
             </c:spPr>
           </c:dPt>
@@ -720,7 +720,7 @@
             <c:idx val="8"/>
             <c:spPr>
               <a:solidFill>
-                <a:srgbClr val="96bb18"/>
+                <a:srgbClr val="8134b6"/>
               </a:solidFill>
             </c:spPr>
           </c:dPt>
@@ -728,7 +728,7 @@
             <c:idx val="9"/>
             <c:spPr>
               <a:solidFill>
-                <a:srgbClr val="0bee13"/>
+                <a:srgbClr val="d28401"/>
               </a:solidFill>
             </c:spPr>
           </c:dPt>
@@ -736,7 +736,7 @@
             <c:idx val="10"/>
             <c:spPr>
               <a:solidFill>
-                <a:srgbClr val="c28510"/>
+                <a:srgbClr val="b04538"/>
               </a:solidFill>
             </c:spPr>
           </c:dPt>
@@ -744,7 +744,7 @@
             <c:idx val="11"/>
             <c:spPr>
               <a:solidFill>
-                <a:srgbClr val="a6e05d"/>
+                <a:srgbClr val="2103fe"/>
               </a:solidFill>
             </c:spPr>
           </c:dPt>
@@ -752,7 +752,7 @@
             <c:idx val="12"/>
             <c:spPr>
               <a:solidFill>
-                <a:srgbClr val="385b7c"/>
+                <a:srgbClr val="2ef661"/>
               </a:solidFill>
             </c:spPr>
           </c:dPt>
@@ -11773,7 +11773,7 @@
       </p:sp>
       <p:graphicFrame>
         <p:nvGraphicFramePr>
-          <p:cNvPr id="3386" name="Chart 3"/>
+          <p:cNvPr id="3714" name="Chart 3"/>
           <p:cNvGraphicFramePr/>
           <p:nvPr>
                     </p:nvPr>

</xml_diff>